<commit_message>
Designed The EXP3 UI
</commit_message>
<xml_diff>
--- a/assets/Screen_UI.pptx
+++ b/assets/Screen_UI.pptx
@@ -11,6 +11,7 @@
     <p:sldId id="256" r:id="rId3"/>
     <p:sldId id="257" r:id="rId5"/>
     <p:sldId id="258" r:id="rId6"/>
+    <p:sldId id="259" r:id="rId7"/>
   </p:sldIdLst>
   <p:sldSz cx="12192000" cy="6858000"/>
   <p:notesSz cx="6858000" cy="9144000"/>
@@ -538,6 +539,54 @@
 </file>
 
 <file path=ppt/notesSlides/notesSlide2.xml><?xml version="1.0" encoding="utf-8"?>
+<p:notes xmlns:a="http://schemas.openxmlformats.org/drawingml/2006/main" xmlns:r="http://schemas.openxmlformats.org/officeDocument/2006/relationships" xmlns:p="http://schemas.openxmlformats.org/presentationml/2006/main">
+  <p:cSld>
+    <p:spTree>
+      <p:nvGrpSpPr>
+        <p:cNvPr id="1" name=""/>
+        <p:cNvGrpSpPr/>
+        <p:nvPr/>
+      </p:nvGrpSpPr>
+      <p:grpSpPr/>
+      <p:sp>
+        <p:nvSpPr>
+          <p:cNvPr id="2" name="幻灯片图像占位符 1"/>
+          <p:cNvSpPr>
+            <a:spLocks noGrp="1"/>
+          </p:cNvSpPr>
+          <p:nvPr>
+            <p:ph type="sldImg" idx="2"/>
+          </p:nvPr>
+        </p:nvSpPr>
+        <p:spPr/>
+      </p:sp>
+      <p:sp>
+        <p:nvSpPr>
+          <p:cNvPr id="3" name="文本占位符 2"/>
+          <p:cNvSpPr>
+            <a:spLocks noGrp="1"/>
+          </p:cNvSpPr>
+          <p:nvPr>
+            <p:ph type="body" idx="3"/>
+          </p:nvPr>
+        </p:nvSpPr>
+        <p:spPr/>
+        <p:txBody>
+          <a:bodyPr/>
+          <a:p>
+            <a:endParaRPr lang="zh-CN" altLang="en-US"/>
+          </a:p>
+        </p:txBody>
+      </p:sp>
+    </p:spTree>
+  </p:cSld>
+  <p:clrMapOvr>
+    <a:masterClrMapping/>
+  </p:clrMapOvr>
+</p:notes>
+</file>
+
+<file path=ppt/notesSlides/notesSlide3.xml><?xml version="1.0" encoding="utf-8"?>
 <p:notes xmlns:a="http://schemas.openxmlformats.org/drawingml/2006/main" xmlns:r="http://schemas.openxmlformats.org/officeDocument/2006/relationships" xmlns:p="http://schemas.openxmlformats.org/presentationml/2006/main">
   <p:cSld>
     <p:spTree>
@@ -10682,6 +10731,734 @@
 </p:sld>
 </file>
 
+<file path=ppt/slides/slide4.xml><?xml version="1.0" encoding="utf-8"?>
+<p:sld xmlns:a="http://schemas.openxmlformats.org/drawingml/2006/main" xmlns:r="http://schemas.openxmlformats.org/officeDocument/2006/relationships" xmlns:p="http://schemas.openxmlformats.org/presentationml/2006/main">
+  <p:cSld>
+    <p:spTree>
+      <p:nvGrpSpPr>
+        <p:cNvPr id="1" name=""/>
+        <p:cNvGrpSpPr/>
+        <p:nvPr/>
+      </p:nvGrpSpPr>
+      <p:grpSpPr/>
+      <p:sp>
+        <p:nvSpPr>
+          <p:cNvPr id="2" name="矩形 1"/>
+          <p:cNvSpPr/>
+          <p:nvPr/>
+        </p:nvSpPr>
+        <p:spPr>
+          <a:xfrm>
+            <a:off x="2453005" y="1276350"/>
+            <a:ext cx="7312025" cy="4305300"/>
+          </a:xfrm>
+          <a:prstGeom prst="rect">
+            <a:avLst/>
+          </a:prstGeom>
+          <a:solidFill>
+            <a:schemeClr val="accent2">
+              <a:lumMod val="60000"/>
+              <a:lumOff val="40000"/>
+            </a:schemeClr>
+          </a:solidFill>
+          <a:ln>
+            <a:noFill/>
+          </a:ln>
+        </p:spPr>
+        <p:style>
+          <a:lnRef idx="2">
+            <a:schemeClr val="accent1">
+              <a:shade val="15000"/>
+            </a:schemeClr>
+          </a:lnRef>
+          <a:fillRef idx="1">
+            <a:schemeClr val="accent1"/>
+          </a:fillRef>
+          <a:effectRef idx="0">
+            <a:schemeClr val="accent1"/>
+          </a:effectRef>
+          <a:fontRef idx="minor">
+            <a:schemeClr val="lt1"/>
+          </a:fontRef>
+        </p:style>
+        <p:txBody>
+          <a:bodyPr rtlCol="0" anchor="ctr"/>
+          <a:p>
+            <a:pPr algn="ctr"/>
+            <a:endParaRPr lang="zh-CN" altLang="en-US"/>
+          </a:p>
+        </p:txBody>
+      </p:sp>
+      <p:sp>
+        <p:nvSpPr>
+          <p:cNvPr id="3" name="文本框 2"/>
+          <p:cNvSpPr txBox="1"/>
+          <p:nvPr/>
+        </p:nvSpPr>
+        <p:spPr>
+          <a:xfrm>
+            <a:off x="4655503" y="1570990"/>
+            <a:ext cx="2907030" cy="460375"/>
+          </a:xfrm>
+          <a:prstGeom prst="rect">
+            <a:avLst/>
+          </a:prstGeom>
+          <a:noFill/>
+        </p:spPr>
+        <p:txBody>
+          <a:bodyPr wrap="square" rtlCol="0">
+            <a:spAutoFit/>
+          </a:bodyPr>
+          <a:p>
+            <a:r>
+              <a:rPr lang="zh-CN" altLang="en-US" sz="2400" b="1"/>
+              <a:t>实验</a:t>
+            </a:r>
+            <a:r>
+              <a:rPr lang="en-US" altLang="zh-CN" sz="2400" b="1"/>
+              <a:t>3 </a:t>
+            </a:r>
+            <a:r>
+              <a:rPr lang="zh-CN" altLang="en-US" sz="2400" b="1"/>
+              <a:t>火焰检测电路</a:t>
+            </a:r>
+            <a:endParaRPr lang="zh-CN" altLang="en-US" sz="2400" b="1"/>
+          </a:p>
+        </p:txBody>
+      </p:sp>
+      <p:sp>
+        <p:nvSpPr>
+          <p:cNvPr id="35" name="圆角矩形 34"/>
+          <p:cNvSpPr/>
+          <p:nvPr/>
+        </p:nvSpPr>
+        <p:spPr>
+          <a:xfrm>
+            <a:off x="2837815" y="2790825"/>
+            <a:ext cx="1565275" cy="1566545"/>
+          </a:xfrm>
+          <a:prstGeom prst="roundRect">
+            <a:avLst/>
+          </a:prstGeom>
+          <a:ln>
+            <a:solidFill>
+              <a:schemeClr val="tx1"/>
+            </a:solidFill>
+          </a:ln>
+        </p:spPr>
+        <p:style>
+          <a:lnRef idx="2">
+            <a:schemeClr val="accent1">
+              <a:lumMod val="75000"/>
+            </a:schemeClr>
+          </a:lnRef>
+          <a:fillRef idx="1">
+            <a:schemeClr val="accent1"/>
+          </a:fillRef>
+          <a:effectRef idx="0">
+            <a:srgbClr val="FFFFFF"/>
+          </a:effectRef>
+          <a:fontRef idx="minor">
+            <a:schemeClr val="lt1"/>
+          </a:fontRef>
+        </p:style>
+        <p:txBody>
+          <a:bodyPr rtlCol="0" anchor="ctr"/>
+          <a:p>
+            <a:pPr algn="ctr"/>
+            <a:endParaRPr lang="zh-CN" altLang="en-US"/>
+          </a:p>
+        </p:txBody>
+      </p:sp>
+      <p:sp>
+        <p:nvSpPr>
+          <p:cNvPr id="38" name="圆角矩形 37"/>
+          <p:cNvSpPr/>
+          <p:nvPr/>
+        </p:nvSpPr>
+        <p:spPr>
+          <a:xfrm>
+            <a:off x="2837815" y="4430395"/>
+            <a:ext cx="1564640" cy="437515"/>
+          </a:xfrm>
+          <a:prstGeom prst="roundRect">
+            <a:avLst/>
+          </a:prstGeom>
+          <a:solidFill>
+            <a:schemeClr val="accent2"/>
+          </a:solidFill>
+          <a:ln>
+            <a:noFill/>
+          </a:ln>
+        </p:spPr>
+        <p:style>
+          <a:lnRef idx="2">
+            <a:schemeClr val="accent1">
+              <a:lumMod val="75000"/>
+            </a:schemeClr>
+          </a:lnRef>
+          <a:fillRef idx="1">
+            <a:schemeClr val="accent1"/>
+          </a:fillRef>
+          <a:effectRef idx="0">
+            <a:srgbClr val="FFFFFF"/>
+          </a:effectRef>
+          <a:fontRef idx="minor">
+            <a:schemeClr val="lt1"/>
+          </a:fontRef>
+        </p:style>
+        <p:txBody>
+          <a:bodyPr rtlCol="0" anchor="ctr"/>
+          <a:p>
+            <a:pPr algn="ctr"/>
+            <a:r>
+              <a:rPr lang="zh-CN" altLang="en-US" b="1"/>
+              <a:t>起火标志</a:t>
+            </a:r>
+            <a:endParaRPr lang="zh-CN" altLang="en-US" b="1"/>
+          </a:p>
+        </p:txBody>
+      </p:sp>
+      <p:sp>
+        <p:nvSpPr>
+          <p:cNvPr id="39" name="圆角矩形 38"/>
+          <p:cNvSpPr/>
+          <p:nvPr/>
+        </p:nvSpPr>
+        <p:spPr>
+          <a:xfrm>
+            <a:off x="7145655" y="2031365"/>
+            <a:ext cx="2298065" cy="714375"/>
+          </a:xfrm>
+          <a:prstGeom prst="roundRect">
+            <a:avLst/>
+          </a:prstGeom>
+          <a:solidFill>
+            <a:schemeClr val="accent2"/>
+          </a:solidFill>
+          <a:ln>
+            <a:noFill/>
+          </a:ln>
+        </p:spPr>
+        <p:style>
+          <a:lnRef idx="2">
+            <a:schemeClr val="accent1">
+              <a:lumMod val="75000"/>
+            </a:schemeClr>
+          </a:lnRef>
+          <a:fillRef idx="1">
+            <a:schemeClr val="accent1"/>
+          </a:fillRef>
+          <a:effectRef idx="0">
+            <a:srgbClr val="FFFFFF"/>
+          </a:effectRef>
+          <a:fontRef idx="minor">
+            <a:schemeClr val="lt1"/>
+          </a:fontRef>
+        </p:style>
+        <p:txBody>
+          <a:bodyPr rtlCol="0" anchor="ctr"/>
+          <a:p>
+            <a:pPr algn="ctr"/>
+            <a:r>
+              <a:rPr lang="zh-CN" altLang="en-US" b="1"/>
+              <a:t>饶欣瑶</a:t>
+            </a:r>
+            <a:r>
+              <a:rPr lang="en-US" altLang="zh-CN" b="1"/>
+              <a:t>2022302039</a:t>
+            </a:r>
+            <a:endParaRPr lang="en-US" altLang="zh-CN" b="1"/>
+          </a:p>
+          <a:p>
+            <a:pPr algn="ctr"/>
+            <a:r>
+              <a:rPr lang="zh-CN" altLang="en-US" b="1"/>
+              <a:t>杨俊杰</a:t>
+            </a:r>
+            <a:r>
+              <a:rPr lang="en-US" altLang="zh-CN" b="1"/>
+              <a:t>2022302240</a:t>
+            </a:r>
+            <a:endParaRPr lang="en-US" altLang="zh-CN" b="1"/>
+          </a:p>
+        </p:txBody>
+      </p:sp>
+      <p:sp>
+        <p:nvSpPr>
+          <p:cNvPr id="41" name="椭圆 40"/>
+          <p:cNvSpPr/>
+          <p:nvPr/>
+        </p:nvSpPr>
+        <p:spPr>
+          <a:xfrm>
+            <a:off x="5610860" y="4645025"/>
+            <a:ext cx="666750" cy="680085"/>
+          </a:xfrm>
+          <a:prstGeom prst="ellipse">
+            <a:avLst/>
+          </a:prstGeom>
+          <a:ln>
+            <a:solidFill>
+              <a:schemeClr val="accent1">
+                <a:lumMod val="60000"/>
+                <a:lumOff val="40000"/>
+              </a:schemeClr>
+            </a:solidFill>
+          </a:ln>
+        </p:spPr>
+        <p:style>
+          <a:lnRef idx="2">
+            <a:schemeClr val="accent1">
+              <a:lumMod val="75000"/>
+            </a:schemeClr>
+          </a:lnRef>
+          <a:fillRef idx="1">
+            <a:schemeClr val="accent1"/>
+          </a:fillRef>
+          <a:effectRef idx="0">
+            <a:srgbClr val="FFFFFF"/>
+          </a:effectRef>
+          <a:fontRef idx="minor">
+            <a:schemeClr val="lt1"/>
+          </a:fontRef>
+        </p:style>
+        <p:txBody>
+          <a:bodyPr rtlCol="0" anchor="ctr"/>
+          <a:p>
+            <a:pPr algn="ctr"/>
+            <a:r>
+              <a:rPr lang="zh-CN" altLang="en-US" sz="2000" b="1"/>
+              <a:t>加</a:t>
+            </a:r>
+            <a:endParaRPr lang="zh-CN" altLang="en-US" sz="2000" b="1"/>
+          </a:p>
+        </p:txBody>
+      </p:sp>
+      <p:sp>
+        <p:nvSpPr>
+          <p:cNvPr id="43" name="椭圆 42"/>
+          <p:cNvSpPr/>
+          <p:nvPr/>
+        </p:nvSpPr>
+        <p:spPr>
+          <a:xfrm>
+            <a:off x="7774305" y="4645025"/>
+            <a:ext cx="666750" cy="680085"/>
+          </a:xfrm>
+          <a:prstGeom prst="ellipse">
+            <a:avLst/>
+          </a:prstGeom>
+          <a:ln>
+            <a:solidFill>
+              <a:schemeClr val="accent1">
+                <a:lumMod val="60000"/>
+                <a:lumOff val="40000"/>
+              </a:schemeClr>
+            </a:solidFill>
+          </a:ln>
+        </p:spPr>
+        <p:style>
+          <a:lnRef idx="2">
+            <a:schemeClr val="accent1">
+              <a:lumMod val="75000"/>
+            </a:schemeClr>
+          </a:lnRef>
+          <a:fillRef idx="1">
+            <a:schemeClr val="accent1"/>
+          </a:fillRef>
+          <a:effectRef idx="0">
+            <a:srgbClr val="FFFFFF"/>
+          </a:effectRef>
+          <a:fontRef idx="minor">
+            <a:schemeClr val="lt1"/>
+          </a:fontRef>
+        </p:style>
+        <p:txBody>
+          <a:bodyPr rtlCol="0" anchor="ctr"/>
+          <a:p>
+            <a:pPr algn="ctr"/>
+            <a:r>
+              <a:rPr lang="zh-CN" altLang="en-US" sz="2000" b="1"/>
+              <a:t>减</a:t>
+            </a:r>
+            <a:endParaRPr lang="zh-CN" altLang="en-US" sz="2000" b="1"/>
+          </a:p>
+        </p:txBody>
+      </p:sp>
+      <p:grpSp>
+        <p:nvGrpSpPr>
+          <p:cNvPr id="50" name="组合 49"/>
+          <p:cNvGrpSpPr/>
+          <p:nvPr/>
+        </p:nvGrpSpPr>
+        <p:grpSpPr>
+          <a:xfrm>
+            <a:off x="4655820" y="2790825"/>
+            <a:ext cx="4788535" cy="1808480"/>
+            <a:chOff x="7610" y="4395"/>
+            <a:chExt cx="7541" cy="2848"/>
+          </a:xfrm>
+        </p:grpSpPr>
+        <p:sp>
+          <p:nvSpPr>
+            <p:cNvPr id="44" name="圆角矩形 43"/>
+            <p:cNvSpPr/>
+            <p:nvPr/>
+          </p:nvSpPr>
+          <p:spPr>
+            <a:xfrm>
+              <a:off x="7610" y="4395"/>
+              <a:ext cx="7540" cy="2849"/>
+            </a:xfrm>
+            <a:prstGeom prst="roundRect">
+              <a:avLst/>
+            </a:prstGeom>
+            <a:ln>
+              <a:solidFill>
+                <a:schemeClr val="tx1"/>
+              </a:solidFill>
+            </a:ln>
+          </p:spPr>
+          <p:style>
+            <a:lnRef idx="2">
+              <a:schemeClr val="accent1">
+                <a:lumMod val="75000"/>
+              </a:schemeClr>
+            </a:lnRef>
+            <a:fillRef idx="1">
+              <a:schemeClr val="accent1"/>
+            </a:fillRef>
+            <a:effectRef idx="0">
+              <a:srgbClr val="FFFFFF"/>
+            </a:effectRef>
+            <a:fontRef idx="minor">
+              <a:schemeClr val="lt1"/>
+            </a:fontRef>
+          </p:style>
+          <p:txBody>
+            <a:bodyPr rtlCol="0" anchor="ctr"/>
+            <a:p>
+              <a:pPr algn="l"/>
+              <a:r>
+                <a:rPr lang="zh-CN" altLang="en-US" sz="3600" b="1"/>
+                <a:t>起火的阈值：</a:t>
+              </a:r>
+              <a:r>
+                <a:rPr lang="en-US" altLang="zh-CN" sz="3600" b="1"/>
+                <a:t>	  </a:t>
+              </a:r>
+              <a:endParaRPr lang="en-US" altLang="zh-CN" sz="3600" b="1"/>
+            </a:p>
+            <a:p>
+              <a:pPr algn="l"/>
+              <a:r>
+                <a:rPr lang="zh-CN" altLang="en-US" sz="3600" b="1"/>
+                <a:t>电位器阻值：</a:t>
+              </a:r>
+              <a:r>
+                <a:rPr lang="en-US" altLang="zh-CN" sz="3600" b="1"/>
+                <a:t>	</a:t>
+              </a:r>
+              <a:endParaRPr lang="en-US" altLang="zh-CN" sz="3600" b="1" i="1">
+                <a:latin typeface="Cambria Math" panose="02040503050406030204" pitchFamily="18" charset="0"/>
+                <a:cs typeface="Cambria Math" panose="02040503050406030204" pitchFamily="18" charset="0"/>
+              </a:endParaRPr>
+            </a:p>
+          </p:txBody>
+        </p:sp>
+        <p:graphicFrame>
+          <p:nvGraphicFramePr>
+            <p:cNvPr id="46" name="对象 45"/>
+            <p:cNvGraphicFramePr/>
+            <p:nvPr/>
+          </p:nvGraphicFramePr>
+          <p:xfrm>
+            <a:off x="13471" y="5735"/>
+            <a:ext cx="1680" cy="941"/>
+          </p:xfrm>
+          <a:graphic>
+            <a:graphicData uri="http://schemas.openxmlformats.org/presentationml/2006/ole">
+              <mc:AlternateContent xmlns:mc="http://schemas.openxmlformats.org/markup-compatibility/2006">
+                <mc:Choice xmlns:v="urn:schemas-microsoft-com:vml" Requires="v">
+                  <p:oleObj spid="_x0000_s47" name="" r:id="rId1" imgW="775970" imgH="548640" progId="Equation.KSEE3">
+                    <p:embed/>
+                  </p:oleObj>
+                </mc:Choice>
+                <mc:Fallback>
+                  <p:oleObj name="" r:id="rId1" imgW="775970" imgH="548640" progId="Equation.KSEE3">
+                    <p:embed/>
+                    <p:pic>
+                      <p:nvPicPr>
+                        <p:cNvPr id="0" name="图片 46"/>
+                        <p:cNvPicPr/>
+                        <p:nvPr/>
+                      </p:nvPicPr>
+                      <p:blipFill>
+                        <a:blip r:embed="rId2"/>
+                        <a:stretch>
+                          <a:fillRect/>
+                        </a:stretch>
+                      </p:blipFill>
+                      <p:spPr>
+                        <a:xfrm>
+                          <a:off x="13471" y="5735"/>
+                          <a:ext cx="1680" cy="941"/>
+                        </a:xfrm>
+                        <a:prstGeom prst="rect">
+                          <a:avLst/>
+                        </a:prstGeom>
+                      </p:spPr>
+                    </p:pic>
+                  </p:oleObj>
+                </mc:Fallback>
+              </mc:AlternateContent>
+            </a:graphicData>
+          </a:graphic>
+        </p:graphicFrame>
+        <p:graphicFrame>
+          <p:nvGraphicFramePr>
+            <p:cNvPr id="48" name="对象 47"/>
+            <p:cNvGraphicFramePr/>
+            <p:nvPr/>
+          </p:nvGraphicFramePr>
+          <p:xfrm>
+            <a:off x="13471" y="4869"/>
+            <a:ext cx="1680" cy="941"/>
+          </p:xfrm>
+          <a:graphic>
+            <a:graphicData uri="http://schemas.openxmlformats.org/presentationml/2006/ole">
+              <mc:AlternateContent xmlns:mc="http://schemas.openxmlformats.org/markup-compatibility/2006">
+                <mc:Choice xmlns:v="urn:schemas-microsoft-com:vml" Requires="v">
+                  <p:oleObj spid="_x0000_s49" name="" r:id="rId3" imgW="775970" imgH="548640" progId="Equation.KSEE3">
+                    <p:embed/>
+                  </p:oleObj>
+                </mc:Choice>
+                <mc:Fallback>
+                  <p:oleObj name="" r:id="rId3" imgW="775970" imgH="548640" progId="Equation.KSEE3">
+                    <p:embed/>
+                    <p:pic>
+                      <p:nvPicPr>
+                        <p:cNvPr id="0" name="图片 46"/>
+                        <p:cNvPicPr/>
+                        <p:nvPr/>
+                      </p:nvPicPr>
+                      <p:blipFill>
+                        <a:blip r:embed="rId2"/>
+                        <a:stretch>
+                          <a:fillRect/>
+                        </a:stretch>
+                      </p:blipFill>
+                      <p:spPr>
+                        <a:xfrm>
+                          <a:off x="13471" y="4869"/>
+                          <a:ext cx="1680" cy="941"/>
+                        </a:xfrm>
+                        <a:prstGeom prst="rect">
+                          <a:avLst/>
+                        </a:prstGeom>
+                      </p:spPr>
+                    </p:pic>
+                  </p:oleObj>
+                </mc:Fallback>
+              </mc:AlternateContent>
+            </a:graphicData>
+          </a:graphic>
+        </p:graphicFrame>
+      </p:grpSp>
+      <p:grpSp>
+        <p:nvGrpSpPr>
+          <p:cNvPr id="52" name="组合 51"/>
+          <p:cNvGrpSpPr/>
+          <p:nvPr/>
+        </p:nvGrpSpPr>
+        <p:grpSpPr>
+          <a:xfrm>
+            <a:off x="285115" y="1670685"/>
+            <a:ext cx="1565275" cy="1566545"/>
+            <a:chOff x="763" y="3199"/>
+            <a:chExt cx="2465" cy="2467"/>
+          </a:xfrm>
+        </p:grpSpPr>
+        <p:pic>
+          <p:nvPicPr>
+            <p:cNvPr id="36" name="图片 35"/>
+            <p:cNvPicPr/>
+            <p:nvPr/>
+          </p:nvPicPr>
+          <p:blipFill>
+            <a:blip r:embed="rId4"/>
+            <a:srcRect l="24620" t="4898" r="21907" b="9426"/>
+            <a:stretch>
+              <a:fillRect/>
+            </a:stretch>
+          </p:blipFill>
+          <p:spPr>
+            <a:xfrm>
+              <a:off x="1077" y="3222"/>
+              <a:ext cx="1836" cy="2215"/>
+            </a:xfrm>
+            <a:prstGeom prst="rect">
+              <a:avLst/>
+            </a:prstGeom>
+          </p:spPr>
+        </p:pic>
+        <p:sp>
+          <p:nvSpPr>
+            <p:cNvPr id="51" name="椭圆 50"/>
+            <p:cNvSpPr/>
+            <p:nvPr/>
+          </p:nvSpPr>
+          <p:spPr>
+            <a:xfrm>
+              <a:off x="763" y="3199"/>
+              <a:ext cx="2465" cy="2467"/>
+            </a:xfrm>
+            <a:prstGeom prst="ellipse">
+              <a:avLst/>
+            </a:prstGeom>
+            <a:noFill/>
+            <a:ln>
+              <a:solidFill>
+                <a:schemeClr val="tx1"/>
+              </a:solidFill>
+            </a:ln>
+            <a:extLst>
+              <a:ext uri="{909E8E84-426E-40DD-AFC4-6F175D3DCCD1}">
+                <a14:hiddenFill xmlns:a14="http://schemas.microsoft.com/office/drawing/2010/main">
+                  <a:solidFill>
+                    <a:schemeClr val="accent1"/>
+                  </a:solidFill>
+                </a14:hiddenFill>
+              </a:ext>
+            </a:extLst>
+          </p:spPr>
+          <p:style>
+            <a:lnRef idx="2">
+              <a:schemeClr val="accent1">
+                <a:lumMod val="75000"/>
+              </a:schemeClr>
+            </a:lnRef>
+            <a:fillRef idx="1">
+              <a:schemeClr val="accent1"/>
+            </a:fillRef>
+            <a:effectRef idx="0">
+              <a:srgbClr val="FFFFFF"/>
+            </a:effectRef>
+            <a:fontRef idx="minor">
+              <a:schemeClr val="lt1"/>
+            </a:fontRef>
+          </p:style>
+          <p:txBody>
+            <a:bodyPr rtlCol="0" anchor="ctr"/>
+            <a:p>
+              <a:pPr algn="ctr"/>
+              <a:endParaRPr lang="zh-CN" altLang="en-US"/>
+            </a:p>
+          </p:txBody>
+        </p:sp>
+      </p:grpSp>
+      <p:sp>
+        <p:nvSpPr>
+          <p:cNvPr id="55" name="椭圆 54"/>
+          <p:cNvSpPr/>
+          <p:nvPr/>
+        </p:nvSpPr>
+        <p:spPr>
+          <a:xfrm>
+            <a:off x="285115" y="3758565"/>
+            <a:ext cx="1565275" cy="1566545"/>
+          </a:xfrm>
+          <a:prstGeom prst="ellipse">
+            <a:avLst/>
+          </a:prstGeom>
+          <a:noFill/>
+          <a:ln>
+            <a:solidFill>
+              <a:schemeClr val="tx1"/>
+            </a:solidFill>
+          </a:ln>
+          <a:extLst>
+            <a:ext uri="{909E8E84-426E-40DD-AFC4-6F175D3DCCD1}">
+              <a14:hiddenFill xmlns:a14="http://schemas.microsoft.com/office/drawing/2010/main">
+                <a:solidFill>
+                  <a:schemeClr val="accent1"/>
+                </a:solidFill>
+              </a14:hiddenFill>
+            </a:ext>
+          </a:extLst>
+        </p:spPr>
+        <p:style>
+          <a:lnRef idx="2">
+            <a:schemeClr val="accent1">
+              <a:lumMod val="75000"/>
+            </a:schemeClr>
+          </a:lnRef>
+          <a:fillRef idx="1">
+            <a:schemeClr val="accent1"/>
+          </a:fillRef>
+          <a:effectRef idx="0">
+            <a:srgbClr val="FFFFFF"/>
+          </a:effectRef>
+          <a:fontRef idx="minor">
+            <a:schemeClr val="lt1"/>
+          </a:fontRef>
+        </p:style>
+        <p:txBody>
+          <a:bodyPr rtlCol="0" anchor="ctr"/>
+          <a:p>
+            <a:pPr algn="ctr"/>
+            <a:endParaRPr lang="zh-CN" altLang="en-US"/>
+          </a:p>
+        </p:txBody>
+      </p:sp>
+      <p:sp>
+        <p:nvSpPr>
+          <p:cNvPr id="56" name="乘号 55"/>
+          <p:cNvSpPr/>
+          <p:nvPr/>
+        </p:nvSpPr>
+        <p:spPr>
+          <a:xfrm>
+            <a:off x="285115" y="3785235"/>
+            <a:ext cx="1565275" cy="1540510"/>
+          </a:xfrm>
+          <a:prstGeom prst="mathMultiply">
+            <a:avLst/>
+          </a:prstGeom>
+        </p:spPr>
+        <p:style>
+          <a:lnRef idx="2">
+            <a:schemeClr val="accent1">
+              <a:lumMod val="75000"/>
+            </a:schemeClr>
+          </a:lnRef>
+          <a:fillRef idx="1">
+            <a:schemeClr val="accent1"/>
+          </a:fillRef>
+          <a:effectRef idx="0">
+            <a:srgbClr val="FFFFFF"/>
+          </a:effectRef>
+          <a:fontRef idx="minor">
+            <a:schemeClr val="lt1"/>
+          </a:fontRef>
+        </p:style>
+        <p:txBody>
+          <a:bodyPr rtlCol="0" anchor="ctr"/>
+          <a:p>
+            <a:pPr algn="ctr"/>
+            <a:endParaRPr lang="zh-CN" altLang="en-US"/>
+          </a:p>
+        </p:txBody>
+      </p:sp>
+    </p:spTree>
+  </p:cSld>
+  <p:clrMapOvr>
+    <a:masterClrMapping/>
+  </p:clrMapOvr>
+</p:sld>
+</file>
+
 <file path=ppt/tags/tag1.xml><?xml version="1.0" encoding="utf-8"?>
 <p:tagLst xmlns:p="http://schemas.openxmlformats.org/presentationml/2006/main">
   <p:tag name="KSO_WM_DIAGRAM_VIRTUALLY_FRAME" val="{&quot;height&quot;:339,&quot;left&quot;:175,&quot;top&quot;:100.5,&quot;width&quot;:610}"/>

</xml_diff>